<commit_message>
Roadmap WG MoM 210609
Including Documentation strategy in the Roadmap governance document
</commit_message>
<xml_diff>
--- a/Roadmap_WG/210609/Architecture WG_core_system_considerations_210609.pptx
+++ b/Roadmap_WG/210609/Architecture WG_core_system_considerations_210609.pptx
@@ -3241,7 +3241,7 @@
         </p:nvSpPr>
         <p:spPr>
           <a:xfrm>
-            <a:off x="780025" y="241014"/>
+            <a:off x="785624" y="235415"/>
             <a:ext cx="7444938" cy="586589"/>
           </a:xfrm>
           <a:prstGeom prst="rect">
@@ -3280,153 +3280,169 @@
           <a:bodyPr numCol="2" spcCol="404840"/>
           <a:lstStyle/>
           <a:p>
-            <a:pPr marL="134753" indent="-134753" defTabSz="230427">
+            <a:pPr marL="125769" indent="-125769" defTabSz="215066">
               <a:spcBef>
                 <a:spcPts val="100"/>
               </a:spcBef>
               <a:buSzPct val="100000"/>
               <a:buAutoNum type="arabicPeriod" startAt="1"/>
-              <a:defRPr sz="989"/>
+              <a:defRPr sz="924"/>
             </a:pPr>
             <a:r>
               <a:t>EclipseCon - talk proposals - https://www.eclipsecon.org/2021</a:t>
             </a:r>
           </a:p>
           <a:p>
-            <a:pPr marL="134753" indent="-134753" defTabSz="230427">
+            <a:pPr marL="125769" indent="-125769" defTabSz="215066">
               <a:spcBef>
                 <a:spcPts val="100"/>
               </a:spcBef>
               <a:buSzPct val="100000"/>
               <a:buAutoNum type="arabicPeriod" startAt="1"/>
-              <a:defRPr sz="989"/>
+              <a:defRPr sz="924"/>
             </a:pPr>
             <a:r>
               <a:t>v4.4.0 release - what can be released now?</a:t>
             </a:r>
           </a:p>
           <a:p>
-            <a:pPr lvl="1" marL="390785" indent="-134753" defTabSz="230427">
+            <a:pPr lvl="1" marL="364733" indent="-125769" defTabSz="215066">
               <a:spcBef>
                 <a:spcPts val="100"/>
               </a:spcBef>
               <a:buAutoNum type="arabicPeriod" startAt="1"/>
-              <a:defRPr sz="989"/>
+              <a:defRPr sz="924"/>
             </a:pPr>
             <a:r>
-              <a:t>PDE, Configuration, ….</a:t>
-            </a:r>
-          </a:p>
-          <a:p>
-            <a:pPr marL="134753" indent="-134753" defTabSz="230427">
+              <a:rPr>
+                <a:solidFill>
+                  <a:srgbClr val="FF2600"/>
+                </a:solidFill>
+              </a:rPr>
+              <a:t>PDE, Configuration,</a:t>
+            </a:r>
+            <a:r>
+              <a:t> HawkBit, </a:t>
+            </a:r>
+            <a:r>
+              <a:rPr>
+                <a:solidFill>
+                  <a:srgbClr val="FF2600"/>
+                </a:solidFill>
+              </a:rPr>
+              <a:t>Resolved issues from v4.3.0, SysML, QoSMonitor, </a:t>
+            </a:r>
+            <a:r>
+              <a:t>SecurityComplicane, </a:t>
+            </a:r>
+            <a:r>
+              <a:rPr>
+                <a:solidFill>
+                  <a:srgbClr val="FF2600"/>
+                </a:solidFill>
+              </a:rPr>
+              <a:t>Targeted release day July 15.</a:t>
+            </a:r>
+          </a:p>
+          <a:p>
+            <a:pPr marL="125769" indent="-125769" defTabSz="215066">
               <a:spcBef>
                 <a:spcPts val="100"/>
               </a:spcBef>
               <a:buSzPct val="100000"/>
               <a:buAutoNum type="arabicPeriod" startAt="1"/>
-              <a:defRPr sz="989"/>
+              <a:defRPr sz="924"/>
             </a:pPr>
             <a:r>
               <a:t>Documentation</a:t>
             </a:r>
           </a:p>
           <a:p>
-            <a:pPr lvl="1" marL="390785" indent="-134753" defTabSz="230427">
+            <a:pPr lvl="1" marL="364733" indent="-125769" defTabSz="215066">
               <a:spcBef>
                 <a:spcPts val="100"/>
               </a:spcBef>
               <a:buAutoNum type="arabicPeriod" startAt="1"/>
-              <a:defRPr sz="989"/>
+              <a:defRPr sz="924"/>
             </a:pPr>
             <a:r>
               <a:t>Why, what and to whom - Jerker</a:t>
             </a:r>
           </a:p>
           <a:p>
-            <a:pPr lvl="1" marL="390785" indent="-134753" defTabSz="230427">
+            <a:pPr lvl="1" marL="364733" indent="-125769" defTabSz="215066">
               <a:spcBef>
                 <a:spcPts val="100"/>
               </a:spcBef>
               <a:buAutoNum type="arabicPeriod" startAt="1"/>
-              <a:defRPr sz="989"/>
+              <a:defRPr sz="924"/>
             </a:pPr>
             <a:r>
               <a:t>Core system documentation - status Szvetlin/Jerker</a:t>
             </a:r>
           </a:p>
           <a:p>
-            <a:pPr lvl="1" marL="390785" indent="-134753" defTabSz="230427">
+            <a:pPr lvl="1" marL="364733" indent="-125769" defTabSz="215066">
               <a:spcBef>
                 <a:spcPts val="100"/>
               </a:spcBef>
               <a:buAutoNum type="arabicPeriod" startAt="1"/>
-              <a:defRPr sz="989"/>
+              <a:defRPr sz="924"/>
             </a:pPr>
             <a:r>
               <a:t>Adaptor, tools, and tool chains - collection of documentation and what can be released</a:t>
             </a:r>
           </a:p>
           <a:p>
-            <a:pPr lvl="1" marL="390785" indent="-134753" defTabSz="230427">
+            <a:pPr lvl="1" marL="364733" indent="-125769" defTabSz="215066">
               <a:spcBef>
                 <a:spcPts val="100"/>
               </a:spcBef>
               <a:buAutoNum type="arabicPeriod" startAt="1"/>
-              <a:defRPr sz="989"/>
+              <a:defRPr sz="924"/>
             </a:pPr>
             <a:r>
               <a:t>Success stories - documentation</a:t>
             </a:r>
           </a:p>
           <a:p>
-            <a:pPr lvl="1" marL="390785" indent="-134753" defTabSz="230427">
+            <a:pPr lvl="1" marL="364733" indent="-125769" defTabSz="215066">
               <a:spcBef>
                 <a:spcPts val="100"/>
               </a:spcBef>
               <a:buAutoNum type="arabicPeriod" startAt="1"/>
-              <a:defRPr sz="989"/>
+              <a:defRPr sz="924"/>
             </a:pPr>
             <a:r>
               <a:t>Training material e.g. HowTo’s, text book, wiki, … </a:t>
             </a:r>
           </a:p>
           <a:p>
-            <a:pPr marL="134753" indent="-134753" defTabSz="230427">
+            <a:pPr marL="125769" indent="-125769" defTabSz="215066">
               <a:spcBef>
                 <a:spcPts val="100"/>
               </a:spcBef>
               <a:buSzPct val="100000"/>
               <a:buAutoNum type="arabicPeriod" startAt="1"/>
-              <a:defRPr sz="989"/>
+              <a:defRPr sz="924"/>
             </a:pPr>
             <a:r>
               <a:t>CI/CD + Jenkins server for generation of packages for different OS and HW.</a:t>
             </a:r>
           </a:p>
           <a:p>
-            <a:pPr lvl="1" marL="390785" indent="-134753" defTabSz="230427">
+            <a:pPr lvl="1" marL="364733" indent="-125769" defTabSz="215066">
               <a:spcBef>
                 <a:spcPts val="100"/>
               </a:spcBef>
               <a:buAutoNum type="arabicPeriod" startAt="1"/>
-              <a:defRPr sz="720"/>
+              <a:defRPr sz="839"/>
             </a:pPr>
             <a:r>
-              <a:t>Status of CI/CD and packaging process </a:t>
-            </a:r>
-            <a:r>
-              <a:rPr>
-                <a:solidFill>
-                  <a:schemeClr val="accent2"/>
-                </a:solidFill>
-              </a:rPr>
-              <a:t>CI/CD process half way. Docker images for v4.3.0 ready tonight. News flash and links to </a:t>
+              <a:t>Status of CI/CD and packaging process CI/CD process half way. Docker images for v4.3.0 ready tonight. News flash and links to </a:t>
             </a:r>
             <a:r>
               <a:rPr u="sng">
-                <a:solidFill>
-                  <a:srgbClr val="0000FF"/>
-                </a:solidFill>
                 <a:uFill>
                   <a:solidFill>
                     <a:srgbClr val="0000FF"/>
@@ -3437,80 +3453,74 @@
               <a:t>arrowhead.eu</a:t>
             </a:r>
             <a:r>
-              <a:rPr>
-                <a:solidFill>
-                  <a:schemeClr val="accent2"/>
-                </a:solidFill>
-              </a:rPr>
               <a:t> web.</a:t>
             </a:r>
           </a:p>
           <a:p>
-            <a:pPr lvl="1" marL="390785" indent="-134753" defTabSz="230427">
+            <a:pPr lvl="1" marL="364733" indent="-125769" defTabSz="215066">
               <a:spcBef>
                 <a:spcPts val="100"/>
               </a:spcBef>
               <a:buAutoNum type="arabicPeriod" startAt="1"/>
-              <a:defRPr sz="720"/>
+              <a:defRPr sz="839"/>
             </a:pPr>
             <a:r>
-              <a:t>packaging matrix</a:t>
-            </a:r>
-          </a:p>
-          <a:p>
-            <a:pPr marL="134753" indent="-134753" defTabSz="230427">
+              <a:t>packaging matrix, </a:t>
+            </a:r>
+            <a:r>
+              <a:rPr>
+                <a:solidFill>
+                  <a:srgbClr val="FF2600"/>
+                </a:solidFill>
+              </a:rPr>
+              <a:t>Szvetlin will address this in 2 weeks time</a:t>
+            </a:r>
+          </a:p>
+          <a:p>
+            <a:pPr marL="125769" indent="-125769" defTabSz="215066">
               <a:spcBef>
                 <a:spcPts val="100"/>
               </a:spcBef>
               <a:buSzPct val="100000"/>
               <a:buAutoNum type="arabicPeriod" startAt="1"/>
-              <a:defRPr sz="989"/>
+              <a:defRPr sz="924"/>
             </a:pPr>
             <a:r>
               <a:t>Move of code from arrowhead-f to eclipse-arrowhead</a:t>
             </a:r>
             <a:br/>
             <a:r>
+              <a:t>Move only IP okayed by Eclipse repositories and working with v4.3.0. Naming convention of repository names. Proposal of names and repos to move. </a:t>
+            </a:r>
+            <a:r>
               <a:rPr>
                 <a:solidFill>
-                  <a:schemeClr val="accent2"/>
+                  <a:srgbClr val="FF2600"/>
                 </a:solidFill>
               </a:rPr>
-              <a:t>Move only IP okayed by Eclipse repositories and working with v4.3.0. Naming convention of repository names. Proposal of names and repos to move.</a:t>
-            </a:r>
-            <a:r>
-              <a:t> </a:t>
-            </a:r>
-          </a:p>
-          <a:p>
-            <a:pPr marL="134753" indent="-134753" defTabSz="230427">
+              <a:t>To be moved: Libraries, application examples, Szvetlin in charge.</a:t>
+            </a:r>
+          </a:p>
+          <a:p>
+            <a:pPr marL="125769" indent="-125769" defTabSz="215066">
               <a:spcBef>
                 <a:spcPts val="100"/>
               </a:spcBef>
               <a:buSzPct val="100000"/>
               <a:buAutoNum type="arabicPeriod" startAt="1"/>
-              <a:defRPr sz="989"/>
+              <a:defRPr sz="924"/>
             </a:pPr>
             <a:r>
               <a:t>Lowering the entry step - status reports</a:t>
             </a:r>
-            <a:br/>
-            <a:r>
-              <a:rPr>
-                <a:solidFill>
-                  <a:schemeClr val="accent2"/>
-                </a:solidFill>
-              </a:rPr>
-              <a:t>An issue to be created for each step</a:t>
-            </a:r>
-          </a:p>
-          <a:p>
-            <a:pPr lvl="1" marL="390785" indent="-134753" defTabSz="230427">
+          </a:p>
+          <a:p>
+            <a:pPr lvl="1" marL="364733" indent="-125769" defTabSz="215066">
               <a:spcBef>
                 <a:spcPts val="100"/>
               </a:spcBef>
               <a:buAutoNum type="arabicPeriod" startAt="1"/>
-              <a:defRPr sz="720"/>
+              <a:defRPr sz="839"/>
             </a:pPr>
             <a:r>
               <a:t>Gabor - VirtualBox on any environment, core systems + providers and consumers. </a:t>
@@ -3518,69 +3528,100 @@
             <a:r>
               <a:rPr>
                 <a:solidFill>
-                  <a:schemeClr val="accent2"/>
+                  <a:srgbClr val="FF2600"/>
                 </a:solidFill>
               </a:rPr>
               <a:t>On hold, due to time constraints.  Continued after the v4.4.0 version is released.</a:t>
             </a:r>
           </a:p>
           <a:p>
-            <a:pPr lvl="1" marL="390785" indent="-134753" defTabSz="230427">
+            <a:pPr lvl="1" marL="364733" indent="-125769" defTabSz="215066">
               <a:spcBef>
                 <a:spcPts val="100"/>
               </a:spcBef>
               <a:buAutoNum type="arabicPeriod" startAt="1"/>
-              <a:defRPr sz="720"/>
+              <a:defRPr sz="839"/>
             </a:pPr>
             <a:r>
               <a:t>Emanuel - Device deamon, Local cloud deamon, Local cloud management - #3</a:t>
             </a:r>
           </a:p>
           <a:p>
-            <a:pPr lvl="1" marL="390785" indent="-134753" defTabSz="230427">
+            <a:pPr lvl="1" marL="364733" indent="-125769" defTabSz="215066">
               <a:spcBef>
                 <a:spcPts val="100"/>
               </a:spcBef>
               <a:buAutoNum type="arabicPeriod" startAt="1"/>
-              <a:defRPr sz="720"/>
+              <a:defRPr sz="839"/>
             </a:pPr>
             <a:r>
               <a:t>Cristina - From models to code and deployment - </a:t>
             </a:r>
-          </a:p>
-          <a:p>
-            <a:pPr marL="134753" indent="-134753" defTabSz="230427">
+            <a:r>
+              <a:rPr>
+                <a:solidFill>
+                  <a:srgbClr val="FF2600"/>
+                </a:solidFill>
+              </a:rPr>
+              <a:t>Plugin to IDE and Papyrus to select Local clouds and systems you like to include, current development of producers and consumers.</a:t>
+            </a:r>
+            <a:r>
+              <a:t> </a:t>
+            </a:r>
+            <a:br/>
+            <a:r>
+              <a:rPr>
+                <a:solidFill>
+                  <a:srgbClr val="FF2600"/>
+                </a:solidFill>
+              </a:rPr>
+              <a:t>First demo at review #2 June 17. Plugins for authorisation and orchestration policies.</a:t>
+            </a:r>
+            <a:r>
+              <a:t> </a:t>
+            </a:r>
+          </a:p>
+          <a:p>
+            <a:pPr marL="125769" indent="-125769" defTabSz="215066">
               <a:spcBef>
                 <a:spcPts val="100"/>
               </a:spcBef>
               <a:buSzPct val="100000"/>
               <a:buAutoNum type="arabicPeriod" startAt="1"/>
-              <a:defRPr sz="989"/>
+              <a:defRPr sz="924"/>
             </a:pPr>
             <a:r>
               <a:t>Walk through current discussion points - Jerker</a:t>
             </a:r>
           </a:p>
           <a:p>
-            <a:pPr marL="134753" indent="-134753" defTabSz="230427">
+            <a:pPr marL="125769" indent="-125769" defTabSz="215066">
               <a:spcBef>
                 <a:spcPts val="100"/>
               </a:spcBef>
               <a:buSzPct val="100000"/>
               <a:buAutoNum type="arabicPeriod" startAt="1"/>
-              <a:defRPr sz="989"/>
+              <a:defRPr sz="924"/>
             </a:pPr>
             <a:r>
-              <a:t>Issue lists in GitHub </a:t>
-            </a:r>
-          </a:p>
-          <a:p>
-            <a:pPr lvl="1" marL="390785" indent="-134753" defTabSz="230427">
+              <a:t>Issue lists in GitHub - </a:t>
+            </a:r>
+            <a:r>
+              <a:rPr>
+                <a:solidFill>
+                  <a:srgbClr val="FF2600"/>
+                </a:solidFill>
+              </a:rPr>
+              <a:t>not addressed 210608 meeting</a:t>
+            </a:r>
+          </a:p>
+          <a:p>
+            <a:pPr lvl="1" marL="364733" indent="-125769" defTabSz="215066">
               <a:spcBef>
                 <a:spcPts val="100"/>
               </a:spcBef>
               <a:buAutoNum type="arabicPeriod" startAt="1"/>
-              <a:defRPr sz="989">
+              <a:defRPr sz="924">
                 <a:solidFill>
                   <a:schemeClr val="accent2"/>
                 </a:solidFill>
@@ -3591,12 +3632,12 @@
             </a:r>
           </a:p>
           <a:p>
-            <a:pPr lvl="1" marL="390785" indent="-134753" defTabSz="230427">
+            <a:pPr lvl="1" marL="364733" indent="-125769" defTabSz="215066">
               <a:spcBef>
                 <a:spcPts val="100"/>
               </a:spcBef>
               <a:buAutoNum type="arabicPeriod" startAt="1"/>
-              <a:defRPr sz="989">
+              <a:defRPr sz="924">
                 <a:solidFill>
                   <a:schemeClr val="accent2"/>
                 </a:solidFill>
@@ -3607,12 +3648,12 @@
             </a:r>
           </a:p>
           <a:p>
-            <a:pPr lvl="1" marL="390785" indent="-134753" defTabSz="230427">
+            <a:pPr lvl="1" marL="364733" indent="-125769" defTabSz="215066">
               <a:spcBef>
                 <a:spcPts val="100"/>
               </a:spcBef>
               <a:buAutoNum type="arabicPeriod" startAt="1"/>
-              <a:defRPr sz="989">
+              <a:defRPr sz="924">
                 <a:solidFill>
                   <a:schemeClr val="accent2"/>
                 </a:solidFill>
@@ -3623,12 +3664,12 @@
             </a:r>
           </a:p>
           <a:p>
-            <a:pPr lvl="1" marL="390785" indent="-134753" defTabSz="230427">
+            <a:pPr lvl="1" marL="364733" indent="-125769" defTabSz="215066">
               <a:spcBef>
                 <a:spcPts val="100"/>
               </a:spcBef>
               <a:buAutoNum type="arabicPeriod" startAt="1"/>
-              <a:defRPr sz="989">
+              <a:defRPr sz="924">
                 <a:solidFill>
                   <a:schemeClr val="accent2"/>
                 </a:solidFill>
@@ -3639,12 +3680,12 @@
             </a:r>
           </a:p>
           <a:p>
-            <a:pPr lvl="1" marL="390785" indent="-134753" defTabSz="230427">
+            <a:pPr lvl="1" marL="364733" indent="-125769" defTabSz="215066">
               <a:spcBef>
                 <a:spcPts val="100"/>
               </a:spcBef>
               <a:buAutoNum type="arabicPeriod" startAt="1"/>
-              <a:defRPr sz="989">
+              <a:defRPr sz="924">
                 <a:solidFill>
                   <a:schemeClr val="accent2"/>
                 </a:solidFill>
@@ -3655,12 +3696,12 @@
             </a:r>
           </a:p>
           <a:p>
-            <a:pPr lvl="1" marL="390785" indent="-134753" defTabSz="230427">
+            <a:pPr lvl="1" marL="364733" indent="-125769" defTabSz="215066">
               <a:spcBef>
                 <a:spcPts val="100"/>
               </a:spcBef>
               <a:buAutoNum type="arabicPeriod" startAt="1"/>
-              <a:defRPr sz="989">
+              <a:defRPr sz="924">
                 <a:solidFill>
                   <a:schemeClr val="accent2"/>
                 </a:solidFill>
@@ -3671,12 +3712,12 @@
             </a:r>
           </a:p>
           <a:p>
-            <a:pPr lvl="1" marL="390785" indent="-134753" defTabSz="230427">
+            <a:pPr lvl="1" marL="364733" indent="-125769" defTabSz="215066">
               <a:spcBef>
                 <a:spcPts val="100"/>
               </a:spcBef>
               <a:buAutoNum type="arabicPeriod" startAt="1"/>
-              <a:defRPr sz="989">
+              <a:defRPr sz="924">
                 <a:solidFill>
                   <a:schemeClr val="accent2"/>
                 </a:solidFill>
@@ -3687,12 +3728,12 @@
             </a:r>
           </a:p>
           <a:p>
-            <a:pPr lvl="1" marL="390785" indent="-134753" defTabSz="230427">
+            <a:pPr lvl="1" marL="364733" indent="-125769" defTabSz="215066">
               <a:spcBef>
                 <a:spcPts val="100"/>
               </a:spcBef>
               <a:buAutoNum type="arabicPeriod" startAt="1"/>
-              <a:defRPr sz="989">
+              <a:defRPr sz="924">
                 <a:solidFill>
                   <a:schemeClr val="accent2"/>
                 </a:solidFill>
@@ -3703,12 +3744,12 @@
             </a:r>
           </a:p>
           <a:p>
-            <a:pPr lvl="1" marL="390785" indent="-134753" defTabSz="230427">
+            <a:pPr lvl="1" marL="364733" indent="-125769" defTabSz="215066">
               <a:spcBef>
                 <a:spcPts val="100"/>
               </a:spcBef>
               <a:buAutoNum type="arabicPeriod" startAt="1"/>
-              <a:defRPr sz="989">
+              <a:defRPr sz="924">
                 <a:solidFill>
                   <a:schemeClr val="accent2"/>
                 </a:solidFill>
@@ -3719,12 +3760,12 @@
             </a:r>
           </a:p>
           <a:p>
-            <a:pPr lvl="1" marL="390785" indent="-134753" defTabSz="230427">
+            <a:pPr lvl="1" marL="364733" indent="-125769" defTabSz="215066">
               <a:spcBef>
                 <a:spcPts val="100"/>
               </a:spcBef>
               <a:buAutoNum type="arabicPeriod" startAt="1"/>
-              <a:defRPr sz="989">
+              <a:defRPr sz="924">
                 <a:solidFill>
                   <a:schemeClr val="accent2"/>
                 </a:solidFill>
@@ -3735,12 +3776,12 @@
             </a:r>
           </a:p>
           <a:p>
-            <a:pPr lvl="1" marL="390785" indent="-134753" defTabSz="230427">
+            <a:pPr lvl="1" marL="364733" indent="-125769" defTabSz="215066">
               <a:spcBef>
                 <a:spcPts val="100"/>
               </a:spcBef>
               <a:buAutoNum type="arabicPeriod" startAt="1"/>
-              <a:defRPr sz="989">
+              <a:defRPr sz="924">
                 <a:solidFill>
                   <a:schemeClr val="accent2"/>
                 </a:solidFill>
@@ -3751,12 +3792,12 @@
             </a:r>
           </a:p>
           <a:p>
-            <a:pPr lvl="1" marL="390785" indent="-134753" defTabSz="230427">
+            <a:pPr lvl="1" marL="364733" indent="-125769" defTabSz="215066">
               <a:spcBef>
                 <a:spcPts val="100"/>
               </a:spcBef>
               <a:buAutoNum type="arabicPeriod" startAt="1"/>
-              <a:defRPr sz="989">
+              <a:defRPr sz="924">
                 <a:solidFill>
                   <a:schemeClr val="accent2"/>
                 </a:solidFill>
@@ -3767,12 +3808,12 @@
             </a:r>
           </a:p>
           <a:p>
-            <a:pPr lvl="1" marL="390785" indent="-134753" defTabSz="230427">
+            <a:pPr lvl="1" marL="364733" indent="-125769" defTabSz="215066">
               <a:spcBef>
                 <a:spcPts val="100"/>
               </a:spcBef>
               <a:buAutoNum type="arabicPeriod" startAt="1"/>
-              <a:defRPr sz="989">
+              <a:defRPr sz="924">
                 <a:solidFill>
                   <a:schemeClr val="accent2"/>
                 </a:solidFill>
@@ -3783,12 +3824,12 @@
             </a:r>
           </a:p>
           <a:p>
-            <a:pPr lvl="1" marL="390785" indent="-134753" defTabSz="230427">
+            <a:pPr lvl="1" marL="364733" indent="-125769" defTabSz="215066">
               <a:spcBef>
                 <a:spcPts val="100"/>
               </a:spcBef>
               <a:buAutoNum type="arabicPeriod" startAt="1"/>
-              <a:defRPr sz="989">
+              <a:defRPr sz="924">
                 <a:solidFill>
                   <a:schemeClr val="accent2"/>
                 </a:solidFill>
@@ -3799,12 +3840,12 @@
             </a:r>
           </a:p>
           <a:p>
-            <a:pPr lvl="1" marL="390785" indent="-134753" defTabSz="230427">
+            <a:pPr lvl="1" marL="364733" indent="-125769" defTabSz="215066">
               <a:spcBef>
                 <a:spcPts val="100"/>
               </a:spcBef>
               <a:buAutoNum type="arabicPeriod" startAt="1"/>
-              <a:defRPr sz="989">
+              <a:defRPr sz="924">
                 <a:solidFill>
                   <a:schemeClr val="accent2"/>
                 </a:solidFill>
@@ -3815,12 +3856,12 @@
             </a:r>
           </a:p>
           <a:p>
-            <a:pPr lvl="1" marL="390785" indent="-134753" defTabSz="230427">
+            <a:pPr lvl="1" marL="364733" indent="-125769" defTabSz="215066">
               <a:spcBef>
                 <a:spcPts val="100"/>
               </a:spcBef>
               <a:buAutoNum type="arabicPeriod" startAt="1"/>
-              <a:defRPr sz="989">
+              <a:defRPr sz="924">
                 <a:solidFill>
                   <a:schemeClr val="accent2"/>
                 </a:solidFill>
@@ -3831,12 +3872,12 @@
             </a:r>
           </a:p>
           <a:p>
-            <a:pPr lvl="1" marL="390785" indent="-134753" defTabSz="230427">
+            <a:pPr lvl="1" marL="364733" indent="-125769" defTabSz="215066">
               <a:spcBef>
                 <a:spcPts val="100"/>
               </a:spcBef>
               <a:buAutoNum type="arabicPeriod" startAt="1"/>
-              <a:defRPr sz="989">
+              <a:defRPr sz="924">
                 <a:solidFill>
                   <a:schemeClr val="accent2"/>
                 </a:solidFill>
@@ -3847,12 +3888,12 @@
             </a:r>
           </a:p>
           <a:p>
-            <a:pPr lvl="1" marL="390785" indent="-134753" defTabSz="230427">
+            <a:pPr lvl="1" marL="364733" indent="-125769" defTabSz="215066">
               <a:spcBef>
                 <a:spcPts val="100"/>
               </a:spcBef>
               <a:buAutoNum type="arabicPeriod" startAt="1"/>
-              <a:defRPr sz="989">
+              <a:defRPr sz="924">
                 <a:solidFill>
                   <a:schemeClr val="accent2"/>
                 </a:solidFill>
@@ -3863,28 +3904,28 @@
             </a:r>
           </a:p>
           <a:p>
-            <a:pPr lvl="1" marL="390785" indent="-134753" defTabSz="230427">
+            <a:pPr lvl="1" marL="364733" indent="-125769" defTabSz="215066">
               <a:spcBef>
                 <a:spcPts val="100"/>
               </a:spcBef>
               <a:buAutoNum type="arabicPeriod" startAt="1"/>
-              <a:defRPr sz="989">
+              <a:defRPr sz="924">
                 <a:solidFill>
                   <a:schemeClr val="accent2"/>
                 </a:solidFill>
               </a:defRPr>
             </a:pPr>
             <a:r>
-              <a:t>#205 transfered to Raodmap</a:t>
-            </a:r>
-          </a:p>
-          <a:p>
-            <a:pPr lvl="1" marL="390785" indent="-134753" defTabSz="230427">
+              <a:t>#205 transfered to Roadmap</a:t>
+            </a:r>
+          </a:p>
+          <a:p>
+            <a:pPr lvl="1" marL="364733" indent="-125769" defTabSz="215066">
               <a:spcBef>
                 <a:spcPts val="100"/>
               </a:spcBef>
               <a:buAutoNum type="arabicPeriod" startAt="1"/>
-              <a:defRPr sz="989">
+              <a:defRPr sz="924">
                 <a:solidFill>
                   <a:schemeClr val="accent2"/>
                 </a:solidFill>
@@ -3895,12 +3936,12 @@
             </a:r>
           </a:p>
           <a:p>
-            <a:pPr lvl="1" marL="390785" indent="-134753" defTabSz="230427">
+            <a:pPr lvl="1" marL="364733" indent="-125769" defTabSz="215066">
               <a:spcBef>
                 <a:spcPts val="100"/>
               </a:spcBef>
               <a:buAutoNum type="arabicPeriod" startAt="1"/>
-              <a:defRPr sz="989">
+              <a:defRPr sz="924">
                 <a:solidFill>
                   <a:schemeClr val="accent2"/>
                 </a:solidFill>
@@ -3911,12 +3952,12 @@
             </a:r>
           </a:p>
           <a:p>
-            <a:pPr lvl="1" marL="390785" indent="-134753" defTabSz="230427">
+            <a:pPr lvl="1" marL="364733" indent="-125769" defTabSz="215066">
               <a:spcBef>
                 <a:spcPts val="100"/>
               </a:spcBef>
               <a:buAutoNum type="arabicPeriod" startAt="1"/>
-              <a:defRPr sz="989">
+              <a:defRPr sz="924">
                 <a:solidFill>
                   <a:schemeClr val="accent2"/>
                 </a:solidFill>
@@ -3927,26 +3968,34 @@
             </a:r>
           </a:p>
           <a:p>
-            <a:pPr marL="134753" indent="-134753" defTabSz="230427">
+            <a:pPr marL="125769" indent="-125769" defTabSz="215066">
               <a:spcBef>
                 <a:spcPts val="100"/>
               </a:spcBef>
               <a:buSzPct val="100000"/>
               <a:buAutoNum type="arabicPeriod" startAt="1"/>
-              <a:defRPr sz="989"/>
+              <a:defRPr sz="924"/>
             </a:pPr>
             <a:r>
               <a:t>NTP system, #301 </a:t>
             </a:r>
-          </a:p>
-          <a:p>
-            <a:pPr marL="134753" indent="-134753" defTabSz="230427">
+            <a:r>
+              <a:rPr>
+                <a:solidFill>
+                  <a:srgbClr val="FF2600"/>
+                </a:solidFill>
+              </a:rPr>
+              <a:t>not addressed 210608 meeting</a:t>
+            </a:r>
+          </a:p>
+          <a:p>
+            <a:pPr marL="125769" indent="-125769" defTabSz="215066">
               <a:spcBef>
                 <a:spcPts val="100"/>
               </a:spcBef>
               <a:buSzPct val="100000"/>
               <a:buAutoNum type="arabicPeriod" startAt="1"/>
-              <a:defRPr sz="989" u="sng">
+              <a:defRPr sz="924" u="sng">
                 <a:solidFill>
                   <a:srgbClr val="0000FF"/>
                 </a:solidFill>
@@ -3970,7 +4019,15 @@
                 </a:solidFill>
                 <a:uFillTx/>
               </a:rPr>
-              <a:t> certificate server, #302</a:t>
+              <a:t> certificate server, #302 </a:t>
+            </a:r>
+            <a:r>
+              <a:rPr>
+                <a:solidFill>
+                  <a:srgbClr val="FF2600"/>
+                </a:solidFill>
+              </a:rPr>
+              <a:t>not addressed 210608 meeting</a:t>
             </a:r>
           </a:p>
         </p:txBody>
@@ -4073,10 +4130,18 @@
             <a:r>
               <a:rPr>
                 <a:solidFill>
+                  <a:srgbClr val="FF2600"/>
+                </a:solidFill>
+              </a:rPr>
+              <a:t>Planed for the coming 2 weeks, Szvetlin, Jerker to review</a:t>
+            </a:r>
+            <a:r>
+              <a:rPr>
+                <a:solidFill>
                   <a:schemeClr val="accent2"/>
                 </a:solidFill>
               </a:rPr>
-              <a:t>Planed for April, Szvetlin and Mario, Jerker to create an issue on this. Data base structures to be produced for further discussion by Szvetlin.</a:t>
+              <a:t>.</a:t>
             </a:r>
             <a:endParaRPr>
               <a:solidFill>
@@ -4108,14 +4173,14 @@
             <a:r>
               <a:rPr>
                 <a:solidFill>
-                  <a:schemeClr val="accent2"/>
+                  <a:srgbClr val="FF2600"/>
                 </a:solidFill>
               </a:rPr>
-              <a:t>Ask Cristina to present her view on meta data at next meeting.</a:t>
+              <a:t>Cristina and Jerker to prepare a discussion for the Roadmap WG, lime line end of August.</a:t>
             </a:r>
             <a:endParaRPr>
               <a:solidFill>
-                <a:schemeClr val="accent2"/>
+                <a:srgbClr val="FF2600"/>
               </a:solidFill>
             </a:endParaRPr>
           </a:p>
@@ -4136,51 +4201,65 @@
               </a:rPr>
               <a:t> </a:t>
             </a:r>
-            <a:endParaRPr>
-              <a:solidFill>
-                <a:schemeClr val="accent2"/>
-              </a:solidFill>
-            </a:endParaRPr>
           </a:p>
           <a:p>
             <a:pPr lvl="1" marL="775367" indent="-267367">
-              <a:buAutoNum type="arabicPeriod" startAt="1"/>
-              <a:defRPr sz="1500">
-                <a:solidFill>
-                  <a:schemeClr val="accent2"/>
-                </a:solidFill>
-              </a:defRPr>
-            </a:pPr>
-            <a:r>
-              <a:t>Requested updates to be described and updates of SysDD: Szvetlin lead supported by Jerker and Per </a:t>
-            </a:r>
-          </a:p>
-          <a:p>
-            <a:pPr lvl="2" marL="1283367" indent="-267367">
               <a:buAutoNum type="arabicPeriod" startAt="1"/>
               <a:defRPr sz="1500"/>
             </a:pPr>
             <a:r>
-              <a:t>SysDD of Orchestration and Authorisation system</a:t>
-            </a:r>
-          </a:p>
-          <a:p>
-            <a:pPr lvl="2" marL="1283367" indent="-267367">
+              <a:t>SysDD of Orchestration and Authorisation system, </a:t>
+            </a:r>
+            <a:r>
+              <a:rPr>
+                <a:solidFill>
+                  <a:srgbClr val="FF2600"/>
+                </a:solidFill>
+              </a:rPr>
+              <a:t>documentation still pending, Raymond to create an Issues on this and include Niclas proposal there.</a:t>
+            </a:r>
+          </a:p>
+          <a:p>
+            <a:pPr lvl="1" marL="775367" indent="-267367">
               <a:buAutoNum type="arabicPeriod" startAt="1"/>
               <a:defRPr sz="1500"/>
             </a:pPr>
             <a:r>
-              <a:t>Arrowhead X.509 certificate documentation as part of Authorisation SysDD - #11</a:t>
-            </a:r>
-          </a:p>
-          <a:p>
-            <a:pPr lvl="2" marL="1283367" indent="-267367">
+              <a:t>Arrowhead X.509 certificate documentation as part of Authorisation SysDD - #11, </a:t>
+            </a:r>
+            <a:r>
+              <a:rPr>
+                <a:solidFill>
+                  <a:srgbClr val="FF2600"/>
+                </a:solidFill>
+              </a:rPr>
+              <a:t>Emanuell Mid August to mid Sept</a:t>
+            </a:r>
+            <a:r>
+              <a:t>.</a:t>
+            </a:r>
+          </a:p>
+          <a:p>
+            <a:pPr lvl="1" marL="775367" indent="-267367">
               <a:buAutoNum type="arabicPeriod" startAt="1"/>
               <a:defRPr sz="1500"/>
             </a:pPr>
             <a:r>
-              <a:t>Format for Orchestration policy and Authorisation policy data.</a:t>
-            </a:r>
+              <a:t>Format for Orchestration policy and Authorisation policy data, </a:t>
+            </a:r>
+            <a:r>
+              <a:rPr>
+                <a:solidFill>
+                  <a:srgbClr val="FF2600"/>
+                </a:solidFill>
+              </a:rPr>
+              <a:t>Jerker to ask Ulf/Olov t prepare a Roadmap WG discussion in the topic.</a:t>
+            </a:r>
+            <a:endParaRPr>
+              <a:solidFill>
+                <a:srgbClr val="FF2600"/>
+              </a:solidFill>
+            </a:endParaRPr>
           </a:p>
           <a:p>
             <a:pPr marL="267368" indent="-267368">
@@ -4202,7 +4281,15 @@
               </a:defRPr>
             </a:pPr>
             <a:r>
-              <a:t>Scenarios for § 4, 5, and 6, Mario sequence diagram from Marios scenario 2a.</a:t>
+              <a:rPr>
+                <a:solidFill>
+                  <a:srgbClr val="000000"/>
+                </a:solidFill>
+              </a:rPr>
+              <a:t>Scenarios for § 4, 5, and 6, Mario sequence diagram from Marios scenario 2a</a:t>
+            </a:r>
+            <a:r>
+              <a:t>.</a:t>
             </a:r>
             <a:r>
               <a:rPr>
@@ -4212,24 +4299,19 @@
               </a:rPr>
               <a:t>  </a:t>
             </a:r>
-          </a:p>
-          <a:p>
-            <a:pPr lvl="2" marL="1283367" indent="-267367">
-              <a:buAutoNum type="arabicPeriod" startAt="1"/>
-              <a:defRPr sz="1500"/>
-            </a:pPr>
-            <a:r>
-              <a:t>Onboarding procedure system</a:t>
-            </a:r>
-          </a:p>
-          <a:p>
-            <a:pPr lvl="2" marL="1283367" indent="-267367">
-              <a:buAutoNum type="arabicPeriod" startAt="1"/>
-              <a:defRPr sz="1500"/>
-            </a:pPr>
-            <a:r>
-              <a:t>VPN server system required?</a:t>
-            </a:r>
+            <a:r>
+              <a:rPr>
+                <a:solidFill>
+                  <a:srgbClr val="FF2600"/>
+                </a:solidFill>
+              </a:rPr>
+              <a:t>Contact to WAPICE and BnearIT, look for decision next meeting</a:t>
+            </a:r>
+            <a:endParaRPr>
+              <a:solidFill>
+                <a:srgbClr val="FF2600"/>
+              </a:solidFill>
+            </a:endParaRPr>
           </a:p>
           <a:p>
             <a:pPr marL="267368" indent="-267368">
@@ -4238,18 +4320,15 @@
               <a:defRPr sz="1500"/>
             </a:pPr>
             <a:r>
-              <a:t>Possible change of core system database,</a:t>
+              <a:t>Possible change of core system database - </a:t>
             </a:r>
             <a:r>
               <a:rPr>
                 <a:solidFill>
-                  <a:schemeClr val="accent2">
-                    <a:satOff val="-4966"/>
-                    <a:lumOff val="-10549"/>
-                  </a:schemeClr>
+                  <a:srgbClr val="FF2600"/>
                 </a:solidFill>
               </a:rPr>
-              <a:t> Emanuel</a:t>
+              <a:t>not addressed 210608 meeting</a:t>
             </a:r>
             <a:endParaRPr>
               <a:solidFill>
@@ -4263,14 +4342,10 @@
           <a:p>
             <a:pPr lvl="1" marL="775367" indent="-267367">
               <a:buAutoNum type="arabicPeriod" startAt="1"/>
-              <a:defRPr sz="1500">
-                <a:solidFill>
-                  <a:schemeClr val="accent2"/>
-                </a:solidFill>
-              </a:defRPr>
+              <a:defRPr sz="1500"/>
             </a:pPr>
             <a:r>
-              <a:t>Light database is a request - WAPICE, On hold until item 1.1 is a clsoed </a:t>
+              <a:t>Light database is a request - WAPICE, On hold until item 1.1 is a closed </a:t>
             </a:r>
           </a:p>
         </p:txBody>

</xml_diff>